<commit_message>
Added exercise for RStudio IDE
</commit_message>
<xml_diff>
--- a/presentations/pptx/00-Introduction.pptx
+++ b/presentations/pptx/00-Introduction.pptx
@@ -5,7 +5,7 @@
     <p:sldMasterId id="2147483840" r:id="rId1"/>
   </p:sldMasterIdLst>
   <p:notesMasterIdLst>
-    <p:notesMasterId r:id="rId14"/>
+    <p:notesMasterId r:id="rId16"/>
   </p:notesMasterIdLst>
   <p:sldIdLst>
     <p:sldId id="256" r:id="rId2"/>
@@ -20,6 +20,8 @@
     <p:sldId id="265" r:id="rId11"/>
     <p:sldId id="266" r:id="rId12"/>
     <p:sldId id="267" r:id="rId13"/>
+    <p:sldId id="269" r:id="rId14"/>
+    <p:sldId id="268" r:id="rId15"/>
   </p:sldIdLst>
   <p:sldSz cx="12192000" cy="6858000"/>
   <p:notesSz cx="6858000" cy="9144000"/>
@@ -6421,7 +6423,7 @@
         </p:blipFill>
         <p:spPr>
           <a:xfrm>
-            <a:off x="5076042" y="3983394"/>
+            <a:off x="5457042" y="3983394"/>
             <a:ext cx="743979" cy="575421"/>
           </a:xfrm>
           <a:prstGeom prst="rect">
@@ -6520,7 +6522,7 @@
         </p:blipFill>
         <p:spPr>
           <a:xfrm>
-            <a:off x="5991494" y="3983080"/>
+            <a:off x="6372494" y="3983080"/>
             <a:ext cx="623907" cy="623907"/>
           </a:xfrm>
           <a:prstGeom prst="rect">
@@ -6550,7 +6552,7 @@
         </p:blipFill>
         <p:spPr>
           <a:xfrm>
-            <a:off x="3816097" y="3900196"/>
+            <a:off x="4603497" y="3900196"/>
             <a:ext cx="654692" cy="755778"/>
           </a:xfrm>
           <a:prstGeom prst="rect">
@@ -8194,6 +8196,283 @@
 </p:sld>
 </file>
 
+<file path=ppt/slides/slide13.xml><?xml version="1.0" encoding="utf-8"?>
+<p:sld xmlns:a="http://schemas.openxmlformats.org/drawingml/2006/main" xmlns:r="http://schemas.openxmlformats.org/officeDocument/2006/relationships" xmlns:p="http://schemas.openxmlformats.org/presentationml/2006/main">
+  <p:cSld>
+    <p:spTree>
+      <p:nvGrpSpPr>
+        <p:cNvPr id="1" name=""/>
+        <p:cNvGrpSpPr/>
+        <p:nvPr/>
+      </p:nvGrpSpPr>
+      <p:grpSpPr>
+        <a:xfrm>
+          <a:off x="0" y="0"/>
+          <a:ext cx="0" cy="0"/>
+          <a:chOff x="0" y="0"/>
+          <a:chExt cx="0" cy="0"/>
+        </a:xfrm>
+      </p:grpSpPr>
+      <p:sp>
+        <p:nvSpPr>
+          <p:cNvPr id="6" name="Title 5"/>
+          <p:cNvSpPr>
+            <a:spLocks noGrp="1"/>
+          </p:cNvSpPr>
+          <p:nvPr>
+            <p:ph type="ctrTitle"/>
+          </p:nvPr>
+        </p:nvSpPr>
+        <p:spPr/>
+        <p:txBody>
+          <a:bodyPr/>
+          <a:lstStyle/>
+          <a:p>
+            <a:r>
+              <a:rPr lang="en-US" dirty="0" err="1" smtClean="0"/>
+              <a:t>RStudio</a:t>
+            </a:r>
+            <a:endParaRPr lang="he-IL" dirty="0"/>
+          </a:p>
+        </p:txBody>
+      </p:sp>
+      <p:sp>
+        <p:nvSpPr>
+          <p:cNvPr id="7" name="Subtitle 6"/>
+          <p:cNvSpPr>
+            <a:spLocks noGrp="1"/>
+          </p:cNvSpPr>
+          <p:nvPr>
+            <p:ph type="subTitle" idx="1"/>
+          </p:nvPr>
+        </p:nvSpPr>
+        <p:spPr/>
+        <p:txBody>
+          <a:bodyPr/>
+          <a:lstStyle/>
+          <a:p>
+            <a:endParaRPr lang="he-IL"/>
+          </a:p>
+        </p:txBody>
+      </p:sp>
+      <p:sp>
+        <p:nvSpPr>
+          <p:cNvPr id="4" name="Footer Placeholder 3"/>
+          <p:cNvSpPr>
+            <a:spLocks noGrp="1"/>
+          </p:cNvSpPr>
+          <p:nvPr>
+            <p:ph type="ftr" sz="quarter" idx="11"/>
+          </p:nvPr>
+        </p:nvSpPr>
+        <p:spPr/>
+        <p:txBody>
+          <a:bodyPr/>
+          <a:lstStyle/>
+          <a:p>
+            <a:r>
+              <a:rPr lang="en-US" smtClean="0"/>
+              <a:t>Materials by Adi Sarid https://adisarid.github.io and http://www.sarid-ins.com</a:t>
+            </a:r>
+            <a:endParaRPr lang="en-US" dirty="0"/>
+          </a:p>
+        </p:txBody>
+      </p:sp>
+      <p:sp>
+        <p:nvSpPr>
+          <p:cNvPr id="5" name="Slide Number Placeholder 4"/>
+          <p:cNvSpPr>
+            <a:spLocks noGrp="1"/>
+          </p:cNvSpPr>
+          <p:nvPr>
+            <p:ph type="sldNum" sz="quarter" idx="12"/>
+          </p:nvPr>
+        </p:nvSpPr>
+        <p:spPr/>
+        <p:txBody>
+          <a:bodyPr/>
+          <a:lstStyle/>
+          <a:p>
+            <a:fld id="{4FAB73BC-B049-4115-A692-8D63A059BFB8}" type="slidenum">
+              <a:rPr lang="en-US" smtClean="0"/>
+              <a:t>13</a:t>
+            </a:fld>
+            <a:endParaRPr lang="en-US" dirty="0"/>
+          </a:p>
+        </p:txBody>
+      </p:sp>
+    </p:spTree>
+    <p:extLst>
+      <p:ext uri="{BB962C8B-B14F-4D97-AF65-F5344CB8AC3E}">
+        <p14:creationId xmlns:p14="http://schemas.microsoft.com/office/powerpoint/2010/main" val="2997322580"/>
+      </p:ext>
+    </p:extLst>
+  </p:cSld>
+  <p:clrMapOvr>
+    <a:masterClrMapping/>
+  </p:clrMapOvr>
+</p:sld>
+</file>
+
+<file path=ppt/slides/slide14.xml><?xml version="1.0" encoding="utf-8"?>
+<p:sld xmlns:a="http://schemas.openxmlformats.org/drawingml/2006/main" xmlns:r="http://schemas.openxmlformats.org/officeDocument/2006/relationships" xmlns:p="http://schemas.openxmlformats.org/presentationml/2006/main">
+  <p:cSld>
+    <p:spTree>
+      <p:nvGrpSpPr>
+        <p:cNvPr id="1" name=""/>
+        <p:cNvGrpSpPr/>
+        <p:nvPr/>
+      </p:nvGrpSpPr>
+      <p:grpSpPr>
+        <a:xfrm>
+          <a:off x="0" y="0"/>
+          <a:ext cx="0" cy="0"/>
+          <a:chOff x="0" y="0"/>
+          <a:chExt cx="0" cy="0"/>
+        </a:xfrm>
+      </p:grpSpPr>
+      <p:sp>
+        <p:nvSpPr>
+          <p:cNvPr id="2" name="Title 1"/>
+          <p:cNvSpPr>
+            <a:spLocks noGrp="1"/>
+          </p:cNvSpPr>
+          <p:nvPr>
+            <p:ph type="title"/>
+          </p:nvPr>
+        </p:nvSpPr>
+        <p:spPr/>
+        <p:txBody>
+          <a:bodyPr/>
+          <a:lstStyle/>
+          <a:p>
+            <a:r>
+              <a:rPr lang="en-US" dirty="0" smtClean="0"/>
+              <a:t>Exercise</a:t>
+            </a:r>
+            <a:endParaRPr lang="he-IL" dirty="0"/>
+          </a:p>
+        </p:txBody>
+      </p:sp>
+      <p:sp>
+        <p:nvSpPr>
+          <p:cNvPr id="3" name="Content Placeholder 2"/>
+          <p:cNvSpPr>
+            <a:spLocks noGrp="1"/>
+          </p:cNvSpPr>
+          <p:nvPr>
+            <p:ph idx="1"/>
+          </p:nvPr>
+        </p:nvSpPr>
+        <p:spPr/>
+        <p:txBody>
+          <a:bodyPr/>
+          <a:lstStyle/>
+          <a:p>
+            <a:r>
+              <a:rPr lang="en-US" dirty="0" smtClean="0"/>
+              <a:t>Clone the repository (if you know what fork means, do it)</a:t>
+            </a:r>
+          </a:p>
+          <a:p>
+            <a:r>
+              <a:rPr lang="en-US" dirty="0" smtClean="0"/>
+              <a:t>Open up 00-Introduction.Rmd from the exercises folder.</a:t>
+            </a:r>
+          </a:p>
+          <a:p>
+            <a:r>
+              <a:rPr lang="en-US" dirty="0" smtClean="0"/>
+              <a:t>Follow the instructions.</a:t>
+            </a:r>
+          </a:p>
+          <a:p>
+            <a:endParaRPr lang="en-US" dirty="0"/>
+          </a:p>
+          <a:p>
+            <a:endParaRPr lang="en-US" dirty="0" smtClean="0"/>
+          </a:p>
+          <a:p>
+            <a:r>
+              <a:rPr lang="en-US" dirty="0" smtClean="0"/>
+              <a:t>Novice – 30 minutes</a:t>
+            </a:r>
+          </a:p>
+          <a:p>
+            <a:r>
+              <a:rPr lang="en-US" dirty="0" smtClean="0"/>
+              <a:t>Intermediate – 15 minutes</a:t>
+            </a:r>
+            <a:endParaRPr lang="he-IL" dirty="0"/>
+          </a:p>
+        </p:txBody>
+      </p:sp>
+      <p:sp>
+        <p:nvSpPr>
+          <p:cNvPr id="4" name="Footer Placeholder 3"/>
+          <p:cNvSpPr>
+            <a:spLocks noGrp="1"/>
+          </p:cNvSpPr>
+          <p:nvPr>
+            <p:ph type="ftr" sz="quarter" idx="11"/>
+          </p:nvPr>
+        </p:nvSpPr>
+        <p:spPr/>
+        <p:txBody>
+          <a:bodyPr/>
+          <a:lstStyle/>
+          <a:p>
+            <a:r>
+              <a:rPr lang="en-US" smtClean="0"/>
+              <a:t>Materials by Adi Sarid https://adisarid.github.io and http://www.sarid-ins.com</a:t>
+            </a:r>
+            <a:endParaRPr lang="en-US" dirty="0"/>
+          </a:p>
+        </p:txBody>
+      </p:sp>
+      <p:sp>
+        <p:nvSpPr>
+          <p:cNvPr id="5" name="Slide Number Placeholder 4"/>
+          <p:cNvSpPr>
+            <a:spLocks noGrp="1"/>
+          </p:cNvSpPr>
+          <p:nvPr>
+            <p:ph type="sldNum" sz="quarter" idx="12"/>
+          </p:nvPr>
+        </p:nvSpPr>
+        <p:spPr/>
+        <p:txBody>
+          <a:bodyPr/>
+          <a:lstStyle/>
+          <a:p>
+            <a:fld id="{4FAB73BC-B049-4115-A692-8D63A059BFB8}" type="slidenum">
+              <a:rPr lang="en-US" smtClean="0"/>
+              <a:t>14</a:t>
+            </a:fld>
+            <a:endParaRPr lang="en-US" dirty="0"/>
+          </a:p>
+        </p:txBody>
+      </p:sp>
+    </p:spTree>
+    <p:extLst>
+      <p:ext uri="{BB962C8B-B14F-4D97-AF65-F5344CB8AC3E}">
+        <p14:creationId xmlns:p14="http://schemas.microsoft.com/office/powerpoint/2010/main" val="2362242755"/>
+      </p:ext>
+    </p:extLst>
+  </p:cSld>
+  <p:clrMapOvr>
+    <a:masterClrMapping/>
+  </p:clrMapOvr>
+  <p:timing>
+    <p:tnLst>
+      <p:par>
+        <p:cTn id="1" dur="indefinite" restart="never" nodeType="tmRoot"/>
+      </p:par>
+    </p:tnLst>
+  </p:timing>
+</p:sld>
+</file>
+
 <file path=ppt/slides/slide2.xml><?xml version="1.0" encoding="utf-8"?>
 <p:sld xmlns:a="http://schemas.openxmlformats.org/drawingml/2006/main" xmlns:r="http://schemas.openxmlformats.org/officeDocument/2006/relationships" xmlns:p="http://schemas.openxmlformats.org/presentationml/2006/main">
   <p:cSld>

</xml_diff>